<commit_message>
Added changes just minutes before defense
</commit_message>
<xml_diff>
--- a/YP POWERTOOLS.pptx
+++ b/YP POWERTOOLS.pptx
@@ -9256,7 +9256,7 @@
                 <a:spcPct val="100000"/>
               </a:lnSpc>
             </a:pPr>
-            <a:fld id="{A452CFBE-4FDE-4EEC-926D-AAA82ED96FA7}" type="datetime">
+            <a:fld id="{7A36FDDE-CEE7-455C-B351-911B410D77E1}" type="datetime">
               <a:rPr b="0" lang="en-US" sz="1000" spc="-1" strike="noStrike">
                 <a:solidFill>
                   <a:srgbClr val="0d0d0d"/>
@@ -9326,7 +9326,7 @@
                 <a:spcPct val="100000"/>
               </a:lnSpc>
             </a:pPr>
-            <a:fld id="{0F8DC9F7-3931-4107-9C90-A2B6CEE45F75}" type="slidenum">
+            <a:fld id="{3396DA73-1536-42D4-A9C5-994526207AA5}" type="slidenum">
               <a:rPr b="0" lang="en-US" sz="1000" spc="-1" strike="noStrike">
                 <a:solidFill>
                   <a:srgbClr val="0d0d0d"/>
@@ -9987,7 +9987,7 @@
                 <a:spcPct val="100000"/>
               </a:lnSpc>
             </a:pPr>
-            <a:fld id="{13A5FFE8-DDC8-4E71-821A-914B4815D55C}" type="datetime">
+            <a:fld id="{74A1C3AD-031F-4C0B-8F3A-BDF38EC55646}" type="datetime">
               <a:rPr b="0" lang="en-US" sz="1000" spc="-1" strike="noStrike">
                 <a:solidFill>
                   <a:srgbClr val="0d0d0d"/>
@@ -10057,7 +10057,7 @@
                 <a:spcPct val="100000"/>
               </a:lnSpc>
             </a:pPr>
-            <a:fld id="{B815115B-609F-4976-84B6-830A5559D3E5}" type="slidenum">
+            <a:fld id="{AB7E500F-ED71-4E04-92D0-DB683BAB3163}" type="slidenum">
               <a:rPr b="0" lang="en-US" sz="1000" spc="-1" strike="noStrike">
                 <a:solidFill>
                   <a:srgbClr val="0d0d0d"/>
@@ -13681,7 +13681,7 @@
                 <a:spcPct val="100000"/>
               </a:lnSpc>
             </a:pPr>
-            <a:fld id="{1CE6FF1E-2532-412A-A400-2401E7FFE15C}" type="datetime">
+            <a:fld id="{BF51CACC-EE12-43E7-8C69-D31B31372A1D}" type="datetime">
               <a:rPr b="0" lang="en-US" sz="1000" spc="-1" strike="noStrike">
                 <a:solidFill>
                   <a:srgbClr val="0d0d0d"/>
@@ -13751,7 +13751,7 @@
                 <a:spcPct val="100000"/>
               </a:lnSpc>
             </a:pPr>
-            <a:fld id="{351544E1-1173-44BC-A12A-34B5AE827424}" type="slidenum">
+            <a:fld id="{93B3AD31-9441-4A81-9CF0-23C8769E563E}" type="slidenum">
               <a:rPr b="0" lang="en-US" sz="1000" spc="-1" strike="noStrike">
                 <a:solidFill>
                   <a:srgbClr val="0d0d0d"/>
@@ -14138,7 +14138,7 @@
                 <a:spcPct val="100000"/>
               </a:lnSpc>
             </a:pPr>
-            <a:fld id="{F1A25093-B350-42B8-8CE3-D14DADB8CBE2}" type="datetime">
+            <a:fld id="{D690BD2B-309F-4319-BE98-C8206133CAE9}" type="datetime">
               <a:rPr b="0" lang="en-US" sz="1000" spc="-1" strike="noStrike">
                 <a:solidFill>
                   <a:srgbClr val="0d0d0d"/>
@@ -14208,7 +14208,7 @@
                 <a:spcPct val="100000"/>
               </a:lnSpc>
             </a:pPr>
-            <a:fld id="{2883C7D3-732A-4F35-BDD8-D66C03D585E6}" type="slidenum">
+            <a:fld id="{E1E1B855-F5B2-40DF-9458-B06CD183DE78}" type="slidenum">
               <a:rPr b="0" lang="en-US" sz="1000" spc="-1" strike="noStrike">
                 <a:solidFill>
                   <a:srgbClr val="0d0d0d"/>
@@ -14739,7 +14739,7 @@
       </p:pic>
     </p:spTree>
   </p:cSld>
-  <p:transition spd="slow">
+  <p:transition>
     <p:push dir="u"/>
   </p:transition>
   <p:timing>
@@ -14892,7 +14892,7 @@
       </p:sp>
     </p:spTree>
   </p:cSld>
-  <p:transition spd="slow">
+  <p:transition>
     <p:split dir="out" orient="vert"/>
   </p:transition>
   <p:timing>
@@ -15047,7 +15047,7 @@
       </p:sp>
     </p:spTree>
   </p:cSld>
-  <p:transition spd="slow">
+  <p:transition>
     <p:push dir="u"/>
   </p:transition>
   <p:timing>
@@ -16129,7 +16129,25 @@
                 </a:solidFill>
                 <a:latin typeface="Tw Cen MT Condensed"/>
               </a:rPr>
-              <a:t>Better overview of sales</a:t>
+              <a:t>Better overview of sales compared to collecting the reports from all of the 3</a:t>
+            </a:r>
+            <a:r>
+              <a:rPr b="0" lang="en-US" sz="3600" spc="-1" strike="noStrike" baseline="101000">
+                <a:solidFill>
+                  <a:srgbClr val="262626"/>
+                </a:solidFill>
+                <a:latin typeface="Tw Cen MT Condensed"/>
+              </a:rPr>
+              <a:t>rd</a:t>
+            </a:r>
+            <a:r>
+              <a:rPr b="0" lang="en-US" sz="3600" spc="-1" strike="noStrike">
+                <a:solidFill>
+                  <a:srgbClr val="262626"/>
+                </a:solidFill>
+                <a:latin typeface="Tw Cen MT Condensed"/>
+              </a:rPr>
+              <a:t> party websites</a:t>
             </a:r>
             <a:endParaRPr b="0" lang="en-US" sz="3600" spc="-1" strike="noStrike">
               <a:solidFill>

</xml_diff>